<commit_message>
Terrain regenerate on every respawn. Docs tweak
</commit_message>
<xml_diff>
--- a/documentation/Starship_lander.pptx
+++ b/documentation/Starship_lander.pptx
@@ -112,6 +112,11 @@
       </a:defRPr>
     </a:lvl9pPr>
   </p:defaultTextStyle>
+  <p:extLst>
+    <p:ext uri="{EFAFB233-063F-42B5-8137-9DF3F51BA10A}">
+      <p15:sldGuideLst xmlns:p15="http://schemas.microsoft.com/office/powerpoint/2012/main"/>
+    </p:ext>
+  </p:extLst>
 </p:presentation>
 </file>
 
@@ -5887,15 +5892,7 @@
               <a:srgbClr val="969696"/>
             </a:contourClr>
           </a:sp3d>
-          <a:extLst>
-            <a:ext uri="{909E8E84-426E-40DD-AFC4-6F175D3DCCD1}">
-              <a14:hiddenFill xmlns:a14="http://schemas.microsoft.com/office/drawing/2010/main">
-                <a:solidFill>
-                  <a:srgbClr val="FFFFFF"/>
-                </a:solidFill>
-              </a14:hiddenFill>
-            </a:ext>
-          </a:extLst>
+          <a:extLst/>
         </p:spPr>
       </p:pic>
     </p:spTree>
@@ -5963,67 +5960,95 @@
         </p:nvSpPr>
         <p:spPr/>
         <p:txBody>
-          <a:bodyPr/>
-          <a:lstStyle/>
-          <a:p>
-            <a:pPr marL="0" indent="0">
-              <a:buNone/>
-            </a:pPr>
+          <a:bodyPr>
+            <a:normAutofit fontScale="92500"/>
+          </a:bodyPr>
+          <a:lstStyle/>
+          <a:p>
             <a:r>
               <a:rPr lang="nb-NO" dirty="0"/>
-              <a:t>Applikasjonen </a:t>
+              <a:t>Applikasjonen skal </a:t>
             </a:r>
             <a:r>
               <a:rPr lang="nb-NO" dirty="0" smtClean="0"/>
-              <a:t>skal være en visuell </a:t>
+              <a:t>være visuell og interaktiv.</a:t>
+            </a:r>
+          </a:p>
+          <a:p>
+            <a:r>
+              <a:rPr lang="nb-NO" dirty="0" smtClean="0"/>
+              <a:t>Spillet </a:t>
             </a:r>
             <a:r>
               <a:rPr lang="nb-NO" dirty="0"/>
-              <a:t>interaktiv simulering av en rakett. Målet med spillet er å lande raketten på riktig måte, slik at man ikke krasjer. For å styre raketten, kan brukeren svinge </a:t>
+              <a:t>begynner med at raketten faller og målet er å lande raketten på riktig måte, slik at den ikke krasjer</a:t>
             </a:r>
             <a:r>
               <a:rPr lang="nb-NO" dirty="0" smtClean="0"/>
-              <a:t>med "A" </a:t>
+              <a:t>.</a:t>
+            </a:r>
+          </a:p>
+          <a:p>
+            <a:r>
+              <a:rPr lang="nb-NO" dirty="0" smtClean="0"/>
+              <a:t>Terrenget </a:t>
             </a:r>
             <a:r>
               <a:rPr lang="nb-NO" dirty="0"/>
-              <a:t>og </a:t>
+              <a:t>skal være tilfeldig generert</a:t>
+            </a:r>
+            <a:r>
+              <a:rPr lang="nb-NO" dirty="0" smtClean="0"/>
+              <a:t>.</a:t>
+            </a:r>
+          </a:p>
+          <a:p>
+            <a:r>
+              <a:rPr lang="nb-NO" dirty="0" smtClean="0"/>
+              <a:t>For </a:t>
             </a:r>
             <a:r>
               <a:rPr lang="nb-NO" dirty="0"/>
-              <a:t>"</a:t>
+              <a:t>å styre raketten, kan brukeren svinge med "A" og "D" tastene</a:t>
             </a:r>
             <a:r>
               <a:rPr lang="nb-NO" dirty="0" smtClean="0"/>
-              <a:t>D" </a:t>
+              <a:t>.</a:t>
+            </a:r>
+          </a:p>
+          <a:p>
+            <a:r>
+              <a:rPr lang="nb-NO" dirty="0" smtClean="0"/>
+              <a:t>For </a:t>
             </a:r>
             <a:r>
               <a:rPr lang="nb-NO" dirty="0"/>
-              <a:t>tastene. For å fyre rakettmotoren trykker man på </a:t>
-            </a:r>
+              <a:t>å fyre rakettmotoren trykker man på "SPACE". </a:t>
+            </a:r>
+            <a:endParaRPr lang="nb-NO" dirty="0" smtClean="0"/>
+          </a:p>
+          <a:p>
             <a:r>
               <a:rPr lang="nb-NO" dirty="0" smtClean="0"/>
-              <a:t>"SPACE". I </a:t>
+              <a:t>Mulighet for å overstyre </a:t>
             </a:r>
             <a:r>
               <a:rPr lang="nb-NO" dirty="0"/>
-              <a:t>tillegg </a:t>
+              <a:t>satte </a:t>
             </a:r>
             <a:r>
               <a:rPr lang="nb-NO" dirty="0" smtClean="0"/>
-              <a:t>skal brukeren kunne overstyre </a:t>
+              <a:t>simuleringsvariabler</a:t>
+            </a:r>
+          </a:p>
+          <a:p>
+            <a:r>
+              <a:rPr lang="nb-NO" dirty="0" smtClean="0"/>
+              <a:t>Simuleringen </a:t>
             </a:r>
             <a:r>
               <a:rPr lang="nb-NO" dirty="0"/>
-              <a:t>satte miljøvariabler med glidere øverst til venstre på skjermen. Disse lar brukeren manipulere masse, motorkraft og gravitasjon. Simuleringen lar brukeren fly så høyt de vil. Dersom brukeren flyr utenfor skjermen på høyre eller venstre, </a:t>
-            </a:r>
-            <a:r>
-              <a:rPr lang="nb-NO" dirty="0" smtClean="0"/>
-              <a:t>skal simuleringen bli nullstilt</a:t>
-            </a:r>
-            <a:r>
-              <a:rPr lang="nb-NO" dirty="0"/>
-              <a:t>.</a:t>
+              <a:t>lar brukeren fly så høyt de vil. Dersom brukeren flyr utenfor skjermen på høyre eller venstre, skal simuleringen bli nullstilt.</a:t>
             </a:r>
           </a:p>
           <a:p>

</xml_diff>